<commit_message>
Analytics - Advanced pandas
</commit_message>
<xml_diff>
--- a/Analytics/10 - Продвинутый Pandas/10 - Advanced Pandas.pptx
+++ b/Analytics/10 - Продвинутый Pandas/10 - Advanced Pandas.pptx
@@ -230,7 +230,7 @@
           <a:p>
             <a:fld id="{929D4DEE-AA18-4B6A-845C-60AFD9463AA2}" type="datetimeFigureOut">
               <a:rPr lang="ru-RU" smtClean="0"/>
-              <a:t>01.12.2023</a:t>
+              <a:t>06.08.2024</a:t>
             </a:fld>
             <a:endParaRPr lang="ru-RU"/>
           </a:p>
@@ -2138,7 +2138,7 @@
           <a:p>
             <a:fld id="{1D8BD707-D9CF-40AE-B4C6-C98DA3205C09}" type="datetimeFigureOut">
               <a:rPr lang="en-US"/>
-              <a:t>12/1/23</a:t>
+              <a:t>8/6/24</a:t>
             </a:fld>
             <a:endParaRPr lang="en-US"/>
           </a:p>
@@ -2313,7 +2313,7 @@
           <a:p>
             <a:fld id="{1D8BD707-D9CF-40AE-B4C6-C98DA3205C09}" type="datetimeFigureOut">
               <a:rPr lang="en-US"/>
-              <a:t>12/1/23</a:t>
+              <a:t>8/6/24</a:t>
             </a:fld>
             <a:endParaRPr lang="en-US"/>
           </a:p>
@@ -2569,7 +2569,7 @@
           <a:p>
             <a:fld id="{1D8BD707-D9CF-40AE-B4C6-C98DA3205C09}" type="datetimeFigureOut">
               <a:rPr lang="en-US"/>
-              <a:t>12/1/23</a:t>
+              <a:t>8/6/24</a:t>
             </a:fld>
             <a:endParaRPr lang="en-US"/>
           </a:p>
@@ -2747,7 +2747,7 @@
           <a:p>
             <a:fld id="{1D8BD707-D9CF-40AE-B4C6-C98DA3205C09}" type="datetimeFigureOut">
               <a:rPr lang="en-US"/>
-              <a:t>12/1/23</a:t>
+              <a:t>8/6/24</a:t>
             </a:fld>
             <a:endParaRPr lang="en-US"/>
           </a:p>
@@ -2866,7 +2866,7 @@
           <a:p>
             <a:fld id="{1D8BD707-D9CF-40AE-B4C6-C98DA3205C09}" type="datetimeFigureOut">
               <a:rPr lang="en-US"/>
-              <a:t>12/1/23</a:t>
+              <a:t>8/6/24</a:t>
             </a:fld>
             <a:endParaRPr lang="en-US"/>
           </a:p>
@@ -5534,7 +5534,7 @@
           <a:p>
             <a:fld id="{1D8BD707-D9CF-40AE-B4C6-C98DA3205C09}" type="datetimeFigureOut">
               <a:rPr lang="en-US"/>
-              <a:t>12/1/23</a:t>
+              <a:t>8/6/24</a:t>
             </a:fld>
             <a:endParaRPr lang="en-US"/>
           </a:p>
@@ -6492,7 +6492,7 @@
                   <a:srgbClr val="019836"/>
                 </a:solidFill>
               </a:rPr>
-              <a:t>из случайных чисел с индексом дата-время с шагом в 2 часа длинной 100 начиная с 1 января 2021 года</a:t>
+              <a:t>из случайных чисел с индексом дата-время с шагом в 1 час длинной 100 начиная с 1 января 2021 года</a:t>
             </a:r>
             <a:r>
               <a:rPr lang="ru" dirty="0">
@@ -6630,7 +6630,7 @@
                   <a:srgbClr val="019836"/>
                 </a:solidFill>
               </a:rPr>
-              <a:t>из случайных чисел с индексом дата-время с шагом в 2 часа начиная с</a:t>
+              <a:t>из случайных чисел с индексом дата-время с шагом в 1 час начиная с</a:t>
             </a:r>
             <a:r>
               <a:rPr lang="en-US" dirty="0">
@@ -9588,270 +9588,6 @@
       </p:sp>
       <p:sp>
         <p:nvSpPr>
-          <p:cNvPr id="209" name="Google Shape;209;p48"/>
-          <p:cNvSpPr txBox="1">
-            <a:spLocks noGrp="1"/>
-          </p:cNvSpPr>
-          <p:nvPr>
-            <p:ph type="subTitle" idx="3"/>
-          </p:nvPr>
-        </p:nvSpPr>
-        <p:spPr>
-          <a:xfrm>
-            <a:off x="3082400" y="2701811"/>
-            <a:ext cx="5095500" cy="1984839"/>
-          </a:xfrm>
-          <a:prstGeom prst="rect">
-            <a:avLst/>
-          </a:prstGeom>
-        </p:spPr>
-        <p:txBody>
-          <a:bodyPr spcFirstLastPara="1" wrap="square" lIns="91425" tIns="91425" rIns="91425" bIns="91425" anchor="t" anchorCtr="0">
-            <a:normAutofit fontScale="92500" lnSpcReduction="10000"/>
-          </a:bodyPr>
-          <a:lstStyle/>
-          <a:p>
-            <a:pPr marL="0" marR="0" lvl="0" indent="0" algn="l" rtl="0">
-              <a:lnSpc>
-                <a:spcPct val="100000"/>
-              </a:lnSpc>
-              <a:spcBef>
-                <a:spcPts val="0"/>
-              </a:spcBef>
-              <a:spcAft>
-                <a:spcPts val="0"/>
-              </a:spcAft>
-              <a:buNone/>
-            </a:pPr>
-            <a:r>
-              <a:rPr lang="en-US" sz="1150" b="1" dirty="0" err="1"/>
-              <a:t>Teamlead</a:t>
-            </a:r>
-            <a:r>
-              <a:rPr lang="ru-RU" sz="1150" b="1" dirty="0"/>
-              <a:t>, главный инженер проекта –</a:t>
-            </a:r>
-            <a:r>
-              <a:rPr lang="en-US" sz="1150" b="1" dirty="0"/>
-              <a:t> </a:t>
-            </a:r>
-            <a:r>
-              <a:rPr lang="ru-RU" sz="1150" b="1" dirty="0" err="1"/>
-              <a:t>НИИгазэкономика</a:t>
-            </a:r>
-            <a:endParaRPr sz="1150" b="1" dirty="0"/>
-          </a:p>
-          <a:p>
-            <a:pPr marL="0" marR="0" lvl="0" indent="0" algn="l" rtl="0">
-              <a:lnSpc>
-                <a:spcPct val="100000"/>
-              </a:lnSpc>
-              <a:spcBef>
-                <a:spcPts val="0"/>
-              </a:spcBef>
-              <a:spcAft>
-                <a:spcPts val="0"/>
-              </a:spcAft>
-              <a:buNone/>
-            </a:pPr>
-            <a:endParaRPr sz="1150" dirty="0"/>
-          </a:p>
-          <a:p>
-            <a:pPr marL="0" marR="0" lvl="0" indent="0" algn="l" rtl="0">
-              <a:lnSpc>
-                <a:spcPct val="100000"/>
-              </a:lnSpc>
-              <a:spcBef>
-                <a:spcPts val="0"/>
-              </a:spcBef>
-              <a:spcAft>
-                <a:spcPts val="0"/>
-              </a:spcAft>
-              <a:buNone/>
-            </a:pPr>
-            <a:r>
-              <a:rPr lang="ru" sz="1150" b="1" dirty="0"/>
-              <a:t>Опыт:</a:t>
-            </a:r>
-            <a:endParaRPr sz="1150" dirty="0"/>
-          </a:p>
-          <a:p>
-            <a:pPr marL="0" marR="0" lvl="0" indent="0" algn="l" rtl="0">
-              <a:lnSpc>
-                <a:spcPct val="100000"/>
-              </a:lnSpc>
-              <a:spcBef>
-                <a:spcPts val="0"/>
-              </a:spcBef>
-              <a:spcAft>
-                <a:spcPts val="0"/>
-              </a:spcAft>
-              <a:buNone/>
-            </a:pPr>
-            <a:r>
-              <a:rPr lang="ru-RU" sz="1150" dirty="0"/>
-              <a:t>Б</a:t>
-            </a:r>
-            <a:r>
-              <a:rPr lang="ru" sz="1150" dirty="0"/>
-              <a:t>олее 15 лет занимался прикладной математикой и мат моделированием</a:t>
-            </a:r>
-          </a:p>
-          <a:p>
-            <a:pPr marL="0" marR="0" lvl="0" indent="0" algn="l" rtl="0">
-              <a:lnSpc>
-                <a:spcPct val="100000"/>
-              </a:lnSpc>
-              <a:spcBef>
-                <a:spcPts val="0"/>
-              </a:spcBef>
-              <a:spcAft>
-                <a:spcPts val="0"/>
-              </a:spcAft>
-              <a:buNone/>
-            </a:pPr>
-            <a:r>
-              <a:rPr lang="ru" sz="1150" dirty="0"/>
-              <a:t>(Data Scientist) (Python, С++) в НИИ ПАО Газпром</a:t>
-            </a:r>
-            <a:endParaRPr sz="1150" dirty="0"/>
-          </a:p>
-          <a:p>
-            <a:pPr marL="0" marR="0" lvl="0" indent="0" algn="l" rtl="0">
-              <a:lnSpc>
-                <a:spcPct val="100000"/>
-              </a:lnSpc>
-              <a:spcBef>
-                <a:spcPts val="0"/>
-              </a:spcBef>
-              <a:spcAft>
-                <a:spcPts val="0"/>
-              </a:spcAft>
-              <a:buNone/>
-            </a:pPr>
-            <a:endParaRPr sz="1150" dirty="0"/>
-          </a:p>
-          <a:p>
-            <a:pPr marL="0" marR="0" lvl="0" indent="0" algn="l" rtl="0">
-              <a:lnSpc>
-                <a:spcPct val="100000"/>
-              </a:lnSpc>
-              <a:spcBef>
-                <a:spcPts val="0"/>
-              </a:spcBef>
-              <a:spcAft>
-                <a:spcPts val="0"/>
-              </a:spcAft>
-              <a:buNone/>
-            </a:pPr>
-            <a:r>
-              <a:rPr lang="ru" sz="1150" dirty="0"/>
-              <a:t>Анализ временных рядов, эволюционное развитие сложных систем</a:t>
-            </a:r>
-            <a:endParaRPr sz="1150" dirty="0"/>
-          </a:p>
-          <a:p>
-            <a:pPr marL="0" marR="0" lvl="0" indent="0" algn="l" rtl="0">
-              <a:lnSpc>
-                <a:spcPct val="100000"/>
-              </a:lnSpc>
-              <a:spcBef>
-                <a:spcPts val="0"/>
-              </a:spcBef>
-              <a:spcAft>
-                <a:spcPts val="0"/>
-              </a:spcAft>
-              <a:buNone/>
-            </a:pPr>
-            <a:endParaRPr sz="1150" dirty="0"/>
-          </a:p>
-          <a:p>
-            <a:pPr marL="0" marR="0" lvl="0" indent="0" algn="l" rtl="0">
-              <a:lnSpc>
-                <a:spcPct val="100000"/>
-              </a:lnSpc>
-              <a:spcBef>
-                <a:spcPts val="0"/>
-              </a:spcBef>
-              <a:spcAft>
-                <a:spcPts val="0"/>
-              </a:spcAft>
-              <a:buNone/>
-            </a:pPr>
-            <a:r>
-              <a:rPr lang="ru-RU" sz="1150" b="1" dirty="0"/>
-              <a:t>+7 (916) 156-07-82 (</a:t>
-            </a:r>
-            <a:r>
-              <a:rPr lang="en-US" sz="1150" b="1" dirty="0" err="1"/>
-              <a:t>whatsapp</a:t>
-            </a:r>
-            <a:r>
-              <a:rPr lang="en-US" sz="1150" b="1" dirty="0"/>
-              <a:t>)</a:t>
-            </a:r>
-          </a:p>
-          <a:p>
-            <a:pPr marL="0" marR="0" lvl="0" indent="0" algn="l" rtl="0">
-              <a:lnSpc>
-                <a:spcPct val="100000"/>
-              </a:lnSpc>
-              <a:spcBef>
-                <a:spcPts val="0"/>
-              </a:spcBef>
-              <a:spcAft>
-                <a:spcPts val="0"/>
-              </a:spcAft>
-              <a:buNone/>
-            </a:pPr>
-            <a:endParaRPr lang="en-US" sz="1150" b="1" dirty="0"/>
-          </a:p>
-          <a:p>
-            <a:pPr marL="0" marR="0" lvl="0" indent="0" algn="l" rtl="0">
-              <a:lnSpc>
-                <a:spcPct val="100000"/>
-              </a:lnSpc>
-              <a:spcBef>
-                <a:spcPts val="0"/>
-              </a:spcBef>
-              <a:spcAft>
-                <a:spcPts val="0"/>
-              </a:spcAft>
-              <a:buNone/>
-            </a:pPr>
-            <a:r>
-              <a:rPr lang="en-US" sz="1150" b="1" dirty="0"/>
-              <a:t>@</a:t>
-            </a:r>
-            <a:r>
-              <a:rPr lang="en-US" sz="1150" b="1" dirty="0" err="1"/>
-              <a:t>stureiko</a:t>
-            </a:r>
-            <a:r>
-              <a:rPr lang="en-US" sz="1150" b="1" dirty="0"/>
-              <a:t> (TG)</a:t>
-            </a:r>
-            <a:endParaRPr sz="1150" b="1" dirty="0"/>
-          </a:p>
-          <a:p>
-            <a:pPr marL="0" marR="0" lvl="0" indent="0" algn="l" rtl="0">
-              <a:lnSpc>
-                <a:spcPct val="100000"/>
-              </a:lnSpc>
-              <a:spcBef>
-                <a:spcPts val="0"/>
-              </a:spcBef>
-              <a:spcAft>
-                <a:spcPts val="0"/>
-              </a:spcAft>
-              <a:buNone/>
-            </a:pPr>
-            <a:endParaRPr sz="1400" dirty="0"/>
-          </a:p>
-        </p:txBody>
-      </p:sp>
-      <p:sp>
-        <p:nvSpPr>
           <p:cNvPr id="12" name="Google Shape;499;p77">
             <a:extLst>
               <a:ext uri="{FF2B5EF4-FFF2-40B4-BE49-F238E27FC236}">
@@ -9904,7 +9640,7 @@
             </a:br>
             <a:r>
               <a:rPr lang="ru-RU" sz="1800" dirty="0"/>
-              <a:t>06.12 – Визуализация в </a:t>
+              <a:t>07.08 – Визуализация в </a:t>
             </a:r>
             <a:r>
               <a:rPr lang="en-US" sz="1800" dirty="0"/>
@@ -10033,6 +9769,428 @@
           </a:sp3d>
         </p:spPr>
       </p:pic>
+      <p:sp>
+        <p:nvSpPr>
+          <p:cNvPr id="10" name="Google Shape;209;p48">
+            <a:extLst>
+              <a:ext uri="{FF2B5EF4-FFF2-40B4-BE49-F238E27FC236}">
+                <a16:creationId xmlns:a16="http://schemas.microsoft.com/office/drawing/2014/main" id="{0EE552BB-CE3C-A048-8082-CD48D97BE08C}"/>
+              </a:ext>
+            </a:extLst>
+          </p:cNvPr>
+          <p:cNvSpPr txBox="1">
+            <a:spLocks/>
+          </p:cNvSpPr>
+          <p:nvPr/>
+        </p:nvSpPr>
+        <p:spPr>
+          <a:xfrm>
+            <a:off x="3082400" y="2701811"/>
+            <a:ext cx="5938750" cy="2133660"/>
+          </a:xfrm>
+          <a:prstGeom prst="rect">
+            <a:avLst/>
+          </a:prstGeom>
+          <a:noFill/>
+          <a:ln>
+            <a:noFill/>
+          </a:ln>
+        </p:spPr>
+        <p:txBody>
+          <a:bodyPr spcFirstLastPara="1" wrap="square" lIns="91425" tIns="91425" rIns="91425" bIns="91425" anchor="t" anchorCtr="0">
+            <a:normAutofit fontScale="85000" lnSpcReduction="20000"/>
+          </a:bodyPr>
+          <a:lstStyle>
+            <a:lvl1pPr marL="0" lvl="0" algn="l">
+              <a:lnSpc>
+                <a:spcPct val="100000"/>
+              </a:lnSpc>
+              <a:spcBef>
+                <a:spcPts val="0"/>
+              </a:spcBef>
+              <a:spcAft>
+                <a:spcPts val="0"/>
+              </a:spcAft>
+              <a:buClr>
+                <a:schemeClr val="dk1"/>
+              </a:buClr>
+              <a:buSzPts val="1300"/>
+              <a:buNone/>
+              <a:defRPr sz="1300" b="0" i="0">
+                <a:solidFill>
+                  <a:schemeClr val="dk1"/>
+                </a:solidFill>
+                <a:latin typeface="+mn-lt"/>
+                <a:ea typeface="+mn-ea"/>
+                <a:cs typeface="+mn-cs"/>
+              </a:defRPr>
+            </a:lvl1pPr>
+            <a:lvl2pPr marL="457200" lvl="1" algn="l">
+              <a:lnSpc>
+                <a:spcPct val="100000"/>
+              </a:lnSpc>
+              <a:spcBef>
+                <a:spcPts val="0"/>
+              </a:spcBef>
+              <a:spcAft>
+                <a:spcPts val="0"/>
+              </a:spcAft>
+              <a:buClr>
+                <a:schemeClr val="dk1"/>
+              </a:buClr>
+              <a:buSzPts val="1500"/>
+              <a:buNone/>
+              <a:defRPr>
+                <a:solidFill>
+                  <a:schemeClr val="dk1"/>
+                </a:solidFill>
+                <a:latin typeface="+mn-lt"/>
+                <a:ea typeface="+mn-ea"/>
+                <a:cs typeface="+mn-cs"/>
+              </a:defRPr>
+            </a:lvl2pPr>
+            <a:lvl3pPr marL="914400" lvl="2" algn="l">
+              <a:lnSpc>
+                <a:spcPct val="100000"/>
+              </a:lnSpc>
+              <a:spcBef>
+                <a:spcPts val="0"/>
+              </a:spcBef>
+              <a:spcAft>
+                <a:spcPts val="0"/>
+              </a:spcAft>
+              <a:buClr>
+                <a:schemeClr val="dk1"/>
+              </a:buClr>
+              <a:buSzPts val="1300"/>
+              <a:buNone/>
+              <a:defRPr>
+                <a:solidFill>
+                  <a:schemeClr val="dk1"/>
+                </a:solidFill>
+                <a:latin typeface="+mn-lt"/>
+                <a:ea typeface="+mn-ea"/>
+                <a:cs typeface="+mn-cs"/>
+              </a:defRPr>
+            </a:lvl3pPr>
+            <a:lvl4pPr marL="1371600" lvl="3" algn="l">
+              <a:lnSpc>
+                <a:spcPct val="100000"/>
+              </a:lnSpc>
+              <a:spcBef>
+                <a:spcPts val="0"/>
+              </a:spcBef>
+              <a:spcAft>
+                <a:spcPts val="0"/>
+              </a:spcAft>
+              <a:buClr>
+                <a:schemeClr val="dk1"/>
+              </a:buClr>
+              <a:buSzPts val="1300"/>
+              <a:buNone/>
+              <a:defRPr>
+                <a:solidFill>
+                  <a:schemeClr val="dk1"/>
+                </a:solidFill>
+                <a:latin typeface="+mn-lt"/>
+                <a:ea typeface="+mn-ea"/>
+                <a:cs typeface="+mn-cs"/>
+              </a:defRPr>
+            </a:lvl4pPr>
+            <a:lvl5pPr marL="1828800" lvl="4" algn="l">
+              <a:lnSpc>
+                <a:spcPct val="100000"/>
+              </a:lnSpc>
+              <a:spcBef>
+                <a:spcPts val="0"/>
+              </a:spcBef>
+              <a:spcAft>
+                <a:spcPts val="0"/>
+              </a:spcAft>
+              <a:buClr>
+                <a:schemeClr val="dk1"/>
+              </a:buClr>
+              <a:buSzPts val="1300"/>
+              <a:buNone/>
+              <a:defRPr>
+                <a:solidFill>
+                  <a:schemeClr val="dk1"/>
+                </a:solidFill>
+                <a:latin typeface="+mn-lt"/>
+                <a:ea typeface="+mn-ea"/>
+                <a:cs typeface="+mn-cs"/>
+              </a:defRPr>
+            </a:lvl5pPr>
+            <a:lvl6pPr marL="2286000" lvl="5" algn="l">
+              <a:lnSpc>
+                <a:spcPct val="100000"/>
+              </a:lnSpc>
+              <a:spcBef>
+                <a:spcPts val="0"/>
+              </a:spcBef>
+              <a:spcAft>
+                <a:spcPts val="0"/>
+              </a:spcAft>
+              <a:buClr>
+                <a:schemeClr val="dk1"/>
+              </a:buClr>
+              <a:buSzPts val="1300"/>
+              <a:buNone/>
+              <a:defRPr>
+                <a:solidFill>
+                  <a:schemeClr val="dk1"/>
+                </a:solidFill>
+                <a:latin typeface="+mn-lt"/>
+                <a:ea typeface="+mn-ea"/>
+                <a:cs typeface="+mn-cs"/>
+              </a:defRPr>
+            </a:lvl6pPr>
+            <a:lvl7pPr marL="2743200" lvl="6" algn="l">
+              <a:lnSpc>
+                <a:spcPct val="100000"/>
+              </a:lnSpc>
+              <a:spcBef>
+                <a:spcPts val="0"/>
+              </a:spcBef>
+              <a:spcAft>
+                <a:spcPts val="0"/>
+              </a:spcAft>
+              <a:buClr>
+                <a:schemeClr val="dk1"/>
+              </a:buClr>
+              <a:buSzPts val="1300"/>
+              <a:buNone/>
+              <a:defRPr>
+                <a:solidFill>
+                  <a:schemeClr val="dk1"/>
+                </a:solidFill>
+                <a:latin typeface="+mn-lt"/>
+                <a:ea typeface="+mn-ea"/>
+                <a:cs typeface="+mn-cs"/>
+              </a:defRPr>
+            </a:lvl7pPr>
+            <a:lvl8pPr marL="3200400" lvl="7" algn="l">
+              <a:lnSpc>
+                <a:spcPct val="100000"/>
+              </a:lnSpc>
+              <a:spcBef>
+                <a:spcPts val="0"/>
+              </a:spcBef>
+              <a:spcAft>
+                <a:spcPts val="0"/>
+              </a:spcAft>
+              <a:buClr>
+                <a:schemeClr val="dk1"/>
+              </a:buClr>
+              <a:buSzPts val="1300"/>
+              <a:buNone/>
+              <a:defRPr>
+                <a:solidFill>
+                  <a:schemeClr val="dk1"/>
+                </a:solidFill>
+                <a:latin typeface="+mn-lt"/>
+                <a:ea typeface="+mn-ea"/>
+                <a:cs typeface="+mn-cs"/>
+              </a:defRPr>
+            </a:lvl8pPr>
+            <a:lvl9pPr marL="3657600" lvl="8" algn="l">
+              <a:lnSpc>
+                <a:spcPct val="100000"/>
+              </a:lnSpc>
+              <a:spcBef>
+                <a:spcPts val="0"/>
+              </a:spcBef>
+              <a:spcAft>
+                <a:spcPts val="0"/>
+              </a:spcAft>
+              <a:buClr>
+                <a:schemeClr val="dk1"/>
+              </a:buClr>
+              <a:buSzPts val="1300"/>
+              <a:buNone/>
+              <a:defRPr>
+                <a:solidFill>
+                  <a:schemeClr val="dk1"/>
+                </a:solidFill>
+                <a:latin typeface="+mn-lt"/>
+                <a:ea typeface="+mn-ea"/>
+                <a:cs typeface="+mn-cs"/>
+              </a:defRPr>
+            </a:lvl9pPr>
+          </a:lstStyle>
+          <a:p>
+            <a:pPr marL="1470025" indent="-1465263">
+              <a:tabLst>
+                <a:tab pos="1465263" algn="l"/>
+              </a:tabLst>
+            </a:pPr>
+            <a:r>
+              <a:rPr lang="ru-RU" sz="1150" b="1" kern="0" dirty="0"/>
+              <a:t>Руководитель курсов: </a:t>
+            </a:r>
+            <a:r>
+              <a:rPr lang="en-US" sz="1150" b="1" kern="0" dirty="0"/>
+              <a:t>	Reinforcement Learning, ML Professional, ML Basic, </a:t>
+            </a:r>
+            <a:br>
+              <a:rPr lang="en-US" sz="1150" b="1" kern="0" dirty="0"/>
+            </a:br>
+            <a:r>
+              <a:rPr lang="en-US" sz="1150" b="1" kern="0" dirty="0" err="1"/>
+              <a:t>MLOps</a:t>
+            </a:r>
+            <a:r>
+              <a:rPr lang="en-US" sz="1150" b="1" kern="0" dirty="0"/>
+              <a:t>, </a:t>
+            </a:r>
+            <a:r>
+              <a:rPr lang="en-US" sz="1150" b="1" kern="0" dirty="0" err="1"/>
+              <a:t>FinML</a:t>
+            </a:r>
+            <a:endParaRPr lang="en-US" sz="1150" b="1" kern="0" dirty="0"/>
+          </a:p>
+          <a:p>
+            <a:pPr rtl="0"/>
+            <a:endParaRPr lang="en-US" sz="1150" b="1" kern="0" dirty="0"/>
+          </a:p>
+          <a:p>
+            <a:pPr rtl="0"/>
+            <a:r>
+              <a:rPr lang="en-US" sz="1150" b="1" kern="0" dirty="0" err="1"/>
+              <a:t>Teamlead</a:t>
+            </a:r>
+            <a:r>
+              <a:rPr lang="en-US" sz="1150" b="1" kern="0" dirty="0"/>
+              <a:t>, </a:t>
+            </a:r>
+            <a:r>
+              <a:rPr lang="ru-RU" sz="1150" b="1" kern="0" dirty="0"/>
+              <a:t>главный инженер проекта, </a:t>
+            </a:r>
+          </a:p>
+          <a:p>
+            <a:pPr rtl="0"/>
+            <a:r>
+              <a:rPr lang="ru-RU" sz="1150" b="1" kern="0" dirty="0"/>
+              <a:t>Физический факультет МГУ, </a:t>
+            </a:r>
+            <a:r>
+              <a:rPr lang="en-US" sz="1150" b="1" kern="0" dirty="0"/>
+              <a:t>PhD </a:t>
+            </a:r>
+            <a:r>
+              <a:rPr lang="ru-RU" sz="1150" b="1" kern="0" dirty="0"/>
+              <a:t>теоретическая физика</a:t>
+            </a:r>
+          </a:p>
+          <a:p>
+            <a:pPr rtl="0"/>
+            <a:endParaRPr lang="ru-RU" sz="1150" kern="0" dirty="0"/>
+          </a:p>
+          <a:p>
+            <a:pPr rtl="0"/>
+            <a:r>
+              <a:rPr lang="ru-RU" sz="1150" b="1" kern="0" dirty="0"/>
+              <a:t>Опыт:</a:t>
+            </a:r>
+            <a:endParaRPr lang="ru-RU" sz="1150" kern="0" dirty="0"/>
+          </a:p>
+          <a:p>
+            <a:pPr rtl="0"/>
+            <a:r>
+              <a:rPr lang="ru-RU" sz="1150" kern="0" dirty="0"/>
+              <a:t>Более 15 лет занимался прикладной математикой и мат моделированием</a:t>
+            </a:r>
+          </a:p>
+          <a:p>
+            <a:pPr rtl="0"/>
+            <a:r>
+              <a:rPr lang="ru-RU" sz="1150" kern="0" dirty="0"/>
+              <a:t>(</a:t>
+            </a:r>
+            <a:r>
+              <a:rPr lang="en-US" sz="1150" kern="0" dirty="0"/>
+              <a:t>Data Scientist) (Python, </a:t>
+            </a:r>
+            <a:r>
+              <a:rPr lang="ru-RU" sz="1150" kern="0" dirty="0"/>
+              <a:t>С++) в НИИ ПАО Газпром</a:t>
+            </a:r>
+          </a:p>
+          <a:p>
+            <a:pPr rtl="0"/>
+            <a:endParaRPr lang="ru-RU" sz="1150" kern="0" dirty="0"/>
+          </a:p>
+          <a:p>
+            <a:pPr rtl="0"/>
+            <a:endParaRPr lang="ru-RU" sz="1150" b="1" kern="0" dirty="0"/>
+          </a:p>
+          <a:p>
+            <a:pPr rtl="0"/>
+            <a:r>
+              <a:rPr lang="ru-RU" sz="1150" b="1" kern="0" dirty="0"/>
+              <a:t>@</a:t>
+            </a:r>
+            <a:r>
+              <a:rPr lang="en-US" sz="1150" b="1" kern="0" dirty="0" err="1"/>
+              <a:t>stureiko</a:t>
+            </a:r>
+            <a:r>
+              <a:rPr lang="en-US" sz="1150" b="1" kern="0" dirty="0"/>
+              <a:t> (TG)</a:t>
+            </a:r>
+          </a:p>
+          <a:p>
+            <a:pPr rtl="0"/>
+            <a:endParaRPr lang="en-US" sz="1150" b="1" kern="0" dirty="0"/>
+          </a:p>
+          <a:p>
+            <a:pPr rtl="0"/>
+            <a:r>
+              <a:rPr lang="en-US" sz="1150" b="1" kern="0" dirty="0"/>
+              <a:t>LinkedIn: </a:t>
+            </a:r>
+            <a:r>
+              <a:rPr lang="en-US" sz="1150" kern="0" dirty="0">
+                <a:hlinkClick r:id="rId4"/>
+              </a:rPr>
+              <a:t>igor-stureiko</a:t>
+            </a:r>
+            <a:r>
+              <a:rPr lang="en-US" sz="1150" kern="0" dirty="0"/>
+              <a:t> </a:t>
+            </a:r>
+          </a:p>
+          <a:p>
+            <a:pPr rtl="0"/>
+            <a:endParaRPr lang="en-US" sz="1150" kern="0" dirty="0"/>
+          </a:p>
+          <a:p>
+            <a:pPr rtl="0"/>
+            <a:r>
+              <a:rPr lang="en-US" sz="1150" b="1" kern="0" dirty="0"/>
+              <a:t>@</a:t>
+            </a:r>
+            <a:r>
+              <a:rPr lang="en-US" sz="1150" b="1" kern="0" dirty="0" err="1"/>
+              <a:t>rl_fintech</a:t>
+            </a:r>
+            <a:r>
+              <a:rPr lang="en-US" sz="1150" b="1" kern="0" dirty="0"/>
+              <a:t> </a:t>
+            </a:r>
+            <a:r>
+              <a:rPr lang="en-US" sz="1150" kern="0" dirty="0"/>
+              <a:t>(</a:t>
+            </a:r>
+            <a:r>
+              <a:rPr lang="ru-RU" sz="1150" kern="0" dirty="0"/>
+              <a:t>Мой канал о моделях в бизнесе)</a:t>
+            </a:r>
+            <a:endParaRPr lang="ru-RU" sz="1400" kern="0" dirty="0"/>
+          </a:p>
+        </p:txBody>
+      </p:sp>
     </p:spTree>
     <p:extLst>
       <p:ext uri="{BB962C8B-B14F-4D97-AF65-F5344CB8AC3E}">
@@ -10265,270 +10423,6 @@
               <a:t>Игорь Стурейко</a:t>
             </a:r>
             <a:endParaRPr dirty="0"/>
-          </a:p>
-        </p:txBody>
-      </p:sp>
-      <p:sp>
-        <p:nvSpPr>
-          <p:cNvPr id="209" name="Google Shape;209;p48"/>
-          <p:cNvSpPr txBox="1">
-            <a:spLocks noGrp="1"/>
-          </p:cNvSpPr>
-          <p:nvPr>
-            <p:ph type="subTitle" idx="3"/>
-          </p:nvPr>
-        </p:nvSpPr>
-        <p:spPr>
-          <a:xfrm>
-            <a:off x="3082400" y="2701811"/>
-            <a:ext cx="5095500" cy="1984839"/>
-          </a:xfrm>
-          <a:prstGeom prst="rect">
-            <a:avLst/>
-          </a:prstGeom>
-        </p:spPr>
-        <p:txBody>
-          <a:bodyPr spcFirstLastPara="1" wrap="square" lIns="91425" tIns="91425" rIns="91425" bIns="91425" anchor="t" anchorCtr="0">
-            <a:normAutofit fontScale="92500" lnSpcReduction="10000"/>
-          </a:bodyPr>
-          <a:lstStyle/>
-          <a:p>
-            <a:pPr marL="0" marR="0" lvl="0" indent="0" algn="l" rtl="0">
-              <a:lnSpc>
-                <a:spcPct val="100000"/>
-              </a:lnSpc>
-              <a:spcBef>
-                <a:spcPts val="0"/>
-              </a:spcBef>
-              <a:spcAft>
-                <a:spcPts val="0"/>
-              </a:spcAft>
-              <a:buNone/>
-            </a:pPr>
-            <a:r>
-              <a:rPr lang="en-US" sz="1150" b="1" dirty="0" err="1"/>
-              <a:t>Teamlead</a:t>
-            </a:r>
-            <a:r>
-              <a:rPr lang="ru-RU" sz="1150" b="1" dirty="0"/>
-              <a:t>, главный инженер проекта –</a:t>
-            </a:r>
-            <a:r>
-              <a:rPr lang="en-US" sz="1150" b="1" dirty="0"/>
-              <a:t> </a:t>
-            </a:r>
-            <a:r>
-              <a:rPr lang="ru-RU" sz="1150" b="1" dirty="0" err="1"/>
-              <a:t>НИИгазэкономика</a:t>
-            </a:r>
-            <a:endParaRPr sz="1150" b="1" dirty="0"/>
-          </a:p>
-          <a:p>
-            <a:pPr marL="0" marR="0" lvl="0" indent="0" algn="l" rtl="0">
-              <a:lnSpc>
-                <a:spcPct val="100000"/>
-              </a:lnSpc>
-              <a:spcBef>
-                <a:spcPts val="0"/>
-              </a:spcBef>
-              <a:spcAft>
-                <a:spcPts val="0"/>
-              </a:spcAft>
-              <a:buNone/>
-            </a:pPr>
-            <a:endParaRPr sz="1150" dirty="0"/>
-          </a:p>
-          <a:p>
-            <a:pPr marL="0" marR="0" lvl="0" indent="0" algn="l" rtl="0">
-              <a:lnSpc>
-                <a:spcPct val="100000"/>
-              </a:lnSpc>
-              <a:spcBef>
-                <a:spcPts val="0"/>
-              </a:spcBef>
-              <a:spcAft>
-                <a:spcPts val="0"/>
-              </a:spcAft>
-              <a:buNone/>
-            </a:pPr>
-            <a:r>
-              <a:rPr lang="ru" sz="1150" b="1" dirty="0"/>
-              <a:t>Опыт:</a:t>
-            </a:r>
-            <a:endParaRPr sz="1150" dirty="0"/>
-          </a:p>
-          <a:p>
-            <a:pPr marL="0" marR="0" lvl="0" indent="0" algn="l" rtl="0">
-              <a:lnSpc>
-                <a:spcPct val="100000"/>
-              </a:lnSpc>
-              <a:spcBef>
-                <a:spcPts val="0"/>
-              </a:spcBef>
-              <a:spcAft>
-                <a:spcPts val="0"/>
-              </a:spcAft>
-              <a:buNone/>
-            </a:pPr>
-            <a:r>
-              <a:rPr lang="ru-RU" sz="1150" dirty="0"/>
-              <a:t>Б</a:t>
-            </a:r>
-            <a:r>
-              <a:rPr lang="ru" sz="1150" dirty="0"/>
-              <a:t>олее 15 лет занимался прикладной математикой и мат моделированием</a:t>
-            </a:r>
-          </a:p>
-          <a:p>
-            <a:pPr marL="0" marR="0" lvl="0" indent="0" algn="l" rtl="0">
-              <a:lnSpc>
-                <a:spcPct val="100000"/>
-              </a:lnSpc>
-              <a:spcBef>
-                <a:spcPts val="0"/>
-              </a:spcBef>
-              <a:spcAft>
-                <a:spcPts val="0"/>
-              </a:spcAft>
-              <a:buNone/>
-            </a:pPr>
-            <a:r>
-              <a:rPr lang="ru" sz="1150" dirty="0"/>
-              <a:t>(Data Scientist) (Python, С++) в НИИ ПАО Газпром</a:t>
-            </a:r>
-            <a:endParaRPr sz="1150" dirty="0"/>
-          </a:p>
-          <a:p>
-            <a:pPr marL="0" marR="0" lvl="0" indent="0" algn="l" rtl="0">
-              <a:lnSpc>
-                <a:spcPct val="100000"/>
-              </a:lnSpc>
-              <a:spcBef>
-                <a:spcPts val="0"/>
-              </a:spcBef>
-              <a:spcAft>
-                <a:spcPts val="0"/>
-              </a:spcAft>
-              <a:buNone/>
-            </a:pPr>
-            <a:endParaRPr sz="1150" dirty="0"/>
-          </a:p>
-          <a:p>
-            <a:pPr marL="0" marR="0" lvl="0" indent="0" algn="l" rtl="0">
-              <a:lnSpc>
-                <a:spcPct val="100000"/>
-              </a:lnSpc>
-              <a:spcBef>
-                <a:spcPts val="0"/>
-              </a:spcBef>
-              <a:spcAft>
-                <a:spcPts val="0"/>
-              </a:spcAft>
-              <a:buNone/>
-            </a:pPr>
-            <a:r>
-              <a:rPr lang="ru" sz="1150" dirty="0"/>
-              <a:t>Анализ временных рядов, эволюционное развитие сложных систем</a:t>
-            </a:r>
-            <a:endParaRPr sz="1150" dirty="0"/>
-          </a:p>
-          <a:p>
-            <a:pPr marL="0" marR="0" lvl="0" indent="0" algn="l" rtl="0">
-              <a:lnSpc>
-                <a:spcPct val="100000"/>
-              </a:lnSpc>
-              <a:spcBef>
-                <a:spcPts val="0"/>
-              </a:spcBef>
-              <a:spcAft>
-                <a:spcPts val="0"/>
-              </a:spcAft>
-              <a:buNone/>
-            </a:pPr>
-            <a:endParaRPr sz="1150" dirty="0"/>
-          </a:p>
-          <a:p>
-            <a:pPr marL="0" marR="0" lvl="0" indent="0" algn="l" rtl="0">
-              <a:lnSpc>
-                <a:spcPct val="100000"/>
-              </a:lnSpc>
-              <a:spcBef>
-                <a:spcPts val="0"/>
-              </a:spcBef>
-              <a:spcAft>
-                <a:spcPts val="0"/>
-              </a:spcAft>
-              <a:buNone/>
-            </a:pPr>
-            <a:r>
-              <a:rPr lang="ru-RU" sz="1150" b="1" dirty="0"/>
-              <a:t>+7 (916) 156-07-82 (</a:t>
-            </a:r>
-            <a:r>
-              <a:rPr lang="en-US" sz="1150" b="1" dirty="0" err="1"/>
-              <a:t>whatsapp</a:t>
-            </a:r>
-            <a:r>
-              <a:rPr lang="en-US" sz="1150" b="1" dirty="0"/>
-              <a:t>)</a:t>
-            </a:r>
-          </a:p>
-          <a:p>
-            <a:pPr marL="0" marR="0" lvl="0" indent="0" algn="l" rtl="0">
-              <a:lnSpc>
-                <a:spcPct val="100000"/>
-              </a:lnSpc>
-              <a:spcBef>
-                <a:spcPts val="0"/>
-              </a:spcBef>
-              <a:spcAft>
-                <a:spcPts val="0"/>
-              </a:spcAft>
-              <a:buNone/>
-            </a:pPr>
-            <a:endParaRPr lang="en-US" sz="1150" b="1" dirty="0"/>
-          </a:p>
-          <a:p>
-            <a:pPr marL="0" marR="0" lvl="0" indent="0" algn="l" rtl="0">
-              <a:lnSpc>
-                <a:spcPct val="100000"/>
-              </a:lnSpc>
-              <a:spcBef>
-                <a:spcPts val="0"/>
-              </a:spcBef>
-              <a:spcAft>
-                <a:spcPts val="0"/>
-              </a:spcAft>
-              <a:buNone/>
-            </a:pPr>
-            <a:r>
-              <a:rPr lang="en-US" sz="1150" b="1" dirty="0"/>
-              <a:t>@</a:t>
-            </a:r>
-            <a:r>
-              <a:rPr lang="en-US" sz="1150" b="1" dirty="0" err="1"/>
-              <a:t>stureiko</a:t>
-            </a:r>
-            <a:r>
-              <a:rPr lang="en-US" sz="1150" b="1" dirty="0"/>
-              <a:t> (TG)</a:t>
-            </a:r>
-            <a:endParaRPr sz="1150" b="1" dirty="0"/>
-          </a:p>
-          <a:p>
-            <a:pPr marL="0" marR="0" lvl="0" indent="0" algn="l" rtl="0">
-              <a:lnSpc>
-                <a:spcPct val="100000"/>
-              </a:lnSpc>
-              <a:spcBef>
-                <a:spcPts val="0"/>
-              </a:spcBef>
-              <a:spcAft>
-                <a:spcPts val="0"/>
-              </a:spcAft>
-              <a:buNone/>
-            </a:pPr>
-            <a:endParaRPr sz="1400" dirty="0"/>
           </a:p>
         </p:txBody>
       </p:sp>
@@ -10591,6 +10485,428 @@
           </a:sp3d>
         </p:spPr>
       </p:pic>
+      <p:sp>
+        <p:nvSpPr>
+          <p:cNvPr id="10" name="Google Shape;209;p48">
+            <a:extLst>
+              <a:ext uri="{FF2B5EF4-FFF2-40B4-BE49-F238E27FC236}">
+                <a16:creationId xmlns:a16="http://schemas.microsoft.com/office/drawing/2014/main" id="{A5678F40-AE9B-EF45-880D-8307C98EE7B3}"/>
+              </a:ext>
+            </a:extLst>
+          </p:cNvPr>
+          <p:cNvSpPr txBox="1">
+            <a:spLocks/>
+          </p:cNvSpPr>
+          <p:nvPr/>
+        </p:nvSpPr>
+        <p:spPr>
+          <a:xfrm>
+            <a:off x="3082400" y="2701811"/>
+            <a:ext cx="5938750" cy="2133660"/>
+          </a:xfrm>
+          <a:prstGeom prst="rect">
+            <a:avLst/>
+          </a:prstGeom>
+          <a:noFill/>
+          <a:ln>
+            <a:noFill/>
+          </a:ln>
+        </p:spPr>
+        <p:txBody>
+          <a:bodyPr spcFirstLastPara="1" wrap="square" lIns="91425" tIns="91425" rIns="91425" bIns="91425" anchor="t" anchorCtr="0">
+            <a:normAutofit fontScale="85000" lnSpcReduction="20000"/>
+          </a:bodyPr>
+          <a:lstStyle>
+            <a:lvl1pPr marL="0" lvl="0" algn="l">
+              <a:lnSpc>
+                <a:spcPct val="100000"/>
+              </a:lnSpc>
+              <a:spcBef>
+                <a:spcPts val="0"/>
+              </a:spcBef>
+              <a:spcAft>
+                <a:spcPts val="0"/>
+              </a:spcAft>
+              <a:buClr>
+                <a:schemeClr val="dk1"/>
+              </a:buClr>
+              <a:buSzPts val="1300"/>
+              <a:buNone/>
+              <a:defRPr sz="1300" b="0" i="0">
+                <a:solidFill>
+                  <a:schemeClr val="dk1"/>
+                </a:solidFill>
+                <a:latin typeface="+mn-lt"/>
+                <a:ea typeface="+mn-ea"/>
+                <a:cs typeface="+mn-cs"/>
+              </a:defRPr>
+            </a:lvl1pPr>
+            <a:lvl2pPr marL="457200" lvl="1" algn="l">
+              <a:lnSpc>
+                <a:spcPct val="100000"/>
+              </a:lnSpc>
+              <a:spcBef>
+                <a:spcPts val="0"/>
+              </a:spcBef>
+              <a:spcAft>
+                <a:spcPts val="0"/>
+              </a:spcAft>
+              <a:buClr>
+                <a:schemeClr val="dk1"/>
+              </a:buClr>
+              <a:buSzPts val="1500"/>
+              <a:buNone/>
+              <a:defRPr>
+                <a:solidFill>
+                  <a:schemeClr val="dk1"/>
+                </a:solidFill>
+                <a:latin typeface="+mn-lt"/>
+                <a:ea typeface="+mn-ea"/>
+                <a:cs typeface="+mn-cs"/>
+              </a:defRPr>
+            </a:lvl2pPr>
+            <a:lvl3pPr marL="914400" lvl="2" algn="l">
+              <a:lnSpc>
+                <a:spcPct val="100000"/>
+              </a:lnSpc>
+              <a:spcBef>
+                <a:spcPts val="0"/>
+              </a:spcBef>
+              <a:spcAft>
+                <a:spcPts val="0"/>
+              </a:spcAft>
+              <a:buClr>
+                <a:schemeClr val="dk1"/>
+              </a:buClr>
+              <a:buSzPts val="1300"/>
+              <a:buNone/>
+              <a:defRPr>
+                <a:solidFill>
+                  <a:schemeClr val="dk1"/>
+                </a:solidFill>
+                <a:latin typeface="+mn-lt"/>
+                <a:ea typeface="+mn-ea"/>
+                <a:cs typeface="+mn-cs"/>
+              </a:defRPr>
+            </a:lvl3pPr>
+            <a:lvl4pPr marL="1371600" lvl="3" algn="l">
+              <a:lnSpc>
+                <a:spcPct val="100000"/>
+              </a:lnSpc>
+              <a:spcBef>
+                <a:spcPts val="0"/>
+              </a:spcBef>
+              <a:spcAft>
+                <a:spcPts val="0"/>
+              </a:spcAft>
+              <a:buClr>
+                <a:schemeClr val="dk1"/>
+              </a:buClr>
+              <a:buSzPts val="1300"/>
+              <a:buNone/>
+              <a:defRPr>
+                <a:solidFill>
+                  <a:schemeClr val="dk1"/>
+                </a:solidFill>
+                <a:latin typeface="+mn-lt"/>
+                <a:ea typeface="+mn-ea"/>
+                <a:cs typeface="+mn-cs"/>
+              </a:defRPr>
+            </a:lvl4pPr>
+            <a:lvl5pPr marL="1828800" lvl="4" algn="l">
+              <a:lnSpc>
+                <a:spcPct val="100000"/>
+              </a:lnSpc>
+              <a:spcBef>
+                <a:spcPts val="0"/>
+              </a:spcBef>
+              <a:spcAft>
+                <a:spcPts val="0"/>
+              </a:spcAft>
+              <a:buClr>
+                <a:schemeClr val="dk1"/>
+              </a:buClr>
+              <a:buSzPts val="1300"/>
+              <a:buNone/>
+              <a:defRPr>
+                <a:solidFill>
+                  <a:schemeClr val="dk1"/>
+                </a:solidFill>
+                <a:latin typeface="+mn-lt"/>
+                <a:ea typeface="+mn-ea"/>
+                <a:cs typeface="+mn-cs"/>
+              </a:defRPr>
+            </a:lvl5pPr>
+            <a:lvl6pPr marL="2286000" lvl="5" algn="l">
+              <a:lnSpc>
+                <a:spcPct val="100000"/>
+              </a:lnSpc>
+              <a:spcBef>
+                <a:spcPts val="0"/>
+              </a:spcBef>
+              <a:spcAft>
+                <a:spcPts val="0"/>
+              </a:spcAft>
+              <a:buClr>
+                <a:schemeClr val="dk1"/>
+              </a:buClr>
+              <a:buSzPts val="1300"/>
+              <a:buNone/>
+              <a:defRPr>
+                <a:solidFill>
+                  <a:schemeClr val="dk1"/>
+                </a:solidFill>
+                <a:latin typeface="+mn-lt"/>
+                <a:ea typeface="+mn-ea"/>
+                <a:cs typeface="+mn-cs"/>
+              </a:defRPr>
+            </a:lvl6pPr>
+            <a:lvl7pPr marL="2743200" lvl="6" algn="l">
+              <a:lnSpc>
+                <a:spcPct val="100000"/>
+              </a:lnSpc>
+              <a:spcBef>
+                <a:spcPts val="0"/>
+              </a:spcBef>
+              <a:spcAft>
+                <a:spcPts val="0"/>
+              </a:spcAft>
+              <a:buClr>
+                <a:schemeClr val="dk1"/>
+              </a:buClr>
+              <a:buSzPts val="1300"/>
+              <a:buNone/>
+              <a:defRPr>
+                <a:solidFill>
+                  <a:schemeClr val="dk1"/>
+                </a:solidFill>
+                <a:latin typeface="+mn-lt"/>
+                <a:ea typeface="+mn-ea"/>
+                <a:cs typeface="+mn-cs"/>
+              </a:defRPr>
+            </a:lvl7pPr>
+            <a:lvl8pPr marL="3200400" lvl="7" algn="l">
+              <a:lnSpc>
+                <a:spcPct val="100000"/>
+              </a:lnSpc>
+              <a:spcBef>
+                <a:spcPts val="0"/>
+              </a:spcBef>
+              <a:spcAft>
+                <a:spcPts val="0"/>
+              </a:spcAft>
+              <a:buClr>
+                <a:schemeClr val="dk1"/>
+              </a:buClr>
+              <a:buSzPts val="1300"/>
+              <a:buNone/>
+              <a:defRPr>
+                <a:solidFill>
+                  <a:schemeClr val="dk1"/>
+                </a:solidFill>
+                <a:latin typeface="+mn-lt"/>
+                <a:ea typeface="+mn-ea"/>
+                <a:cs typeface="+mn-cs"/>
+              </a:defRPr>
+            </a:lvl8pPr>
+            <a:lvl9pPr marL="3657600" lvl="8" algn="l">
+              <a:lnSpc>
+                <a:spcPct val="100000"/>
+              </a:lnSpc>
+              <a:spcBef>
+                <a:spcPts val="0"/>
+              </a:spcBef>
+              <a:spcAft>
+                <a:spcPts val="0"/>
+              </a:spcAft>
+              <a:buClr>
+                <a:schemeClr val="dk1"/>
+              </a:buClr>
+              <a:buSzPts val="1300"/>
+              <a:buNone/>
+              <a:defRPr>
+                <a:solidFill>
+                  <a:schemeClr val="dk1"/>
+                </a:solidFill>
+                <a:latin typeface="+mn-lt"/>
+                <a:ea typeface="+mn-ea"/>
+                <a:cs typeface="+mn-cs"/>
+              </a:defRPr>
+            </a:lvl9pPr>
+          </a:lstStyle>
+          <a:p>
+            <a:pPr marL="1470025" indent="-1465263">
+              <a:tabLst>
+                <a:tab pos="1465263" algn="l"/>
+              </a:tabLst>
+            </a:pPr>
+            <a:r>
+              <a:rPr lang="ru-RU" sz="1150" b="1" kern="0" dirty="0"/>
+              <a:t>Руководитель курсов: </a:t>
+            </a:r>
+            <a:r>
+              <a:rPr lang="en-US" sz="1150" b="1" kern="0" dirty="0"/>
+              <a:t>	Reinforcement Learning, ML Professional, ML Basic, </a:t>
+            </a:r>
+            <a:br>
+              <a:rPr lang="en-US" sz="1150" b="1" kern="0" dirty="0"/>
+            </a:br>
+            <a:r>
+              <a:rPr lang="en-US" sz="1150" b="1" kern="0" dirty="0" err="1"/>
+              <a:t>MLOps</a:t>
+            </a:r>
+            <a:r>
+              <a:rPr lang="en-US" sz="1150" b="1" kern="0" dirty="0"/>
+              <a:t>, </a:t>
+            </a:r>
+            <a:r>
+              <a:rPr lang="en-US" sz="1150" b="1" kern="0" dirty="0" err="1"/>
+              <a:t>FinML</a:t>
+            </a:r>
+            <a:endParaRPr lang="en-US" sz="1150" b="1" kern="0" dirty="0"/>
+          </a:p>
+          <a:p>
+            <a:pPr rtl="0"/>
+            <a:endParaRPr lang="en-US" sz="1150" b="1" kern="0" dirty="0"/>
+          </a:p>
+          <a:p>
+            <a:pPr rtl="0"/>
+            <a:r>
+              <a:rPr lang="en-US" sz="1150" b="1" kern="0" dirty="0" err="1"/>
+              <a:t>Teamlead</a:t>
+            </a:r>
+            <a:r>
+              <a:rPr lang="en-US" sz="1150" b="1" kern="0" dirty="0"/>
+              <a:t>, </a:t>
+            </a:r>
+            <a:r>
+              <a:rPr lang="ru-RU" sz="1150" b="1" kern="0" dirty="0"/>
+              <a:t>главный инженер проекта, </a:t>
+            </a:r>
+          </a:p>
+          <a:p>
+            <a:pPr rtl="0"/>
+            <a:r>
+              <a:rPr lang="ru-RU" sz="1150" b="1" kern="0" dirty="0"/>
+              <a:t>Физический факультет МГУ, </a:t>
+            </a:r>
+            <a:r>
+              <a:rPr lang="en-US" sz="1150" b="1" kern="0" dirty="0"/>
+              <a:t>PhD </a:t>
+            </a:r>
+            <a:r>
+              <a:rPr lang="ru-RU" sz="1150" b="1" kern="0" dirty="0"/>
+              <a:t>теоретическая физика</a:t>
+            </a:r>
+          </a:p>
+          <a:p>
+            <a:pPr rtl="0"/>
+            <a:endParaRPr lang="ru-RU" sz="1150" kern="0" dirty="0"/>
+          </a:p>
+          <a:p>
+            <a:pPr rtl="0"/>
+            <a:r>
+              <a:rPr lang="ru-RU" sz="1150" b="1" kern="0" dirty="0"/>
+              <a:t>Опыт:</a:t>
+            </a:r>
+            <a:endParaRPr lang="ru-RU" sz="1150" kern="0" dirty="0"/>
+          </a:p>
+          <a:p>
+            <a:pPr rtl="0"/>
+            <a:r>
+              <a:rPr lang="ru-RU" sz="1150" kern="0" dirty="0"/>
+              <a:t>Более 15 лет занимался прикладной математикой и мат моделированием</a:t>
+            </a:r>
+          </a:p>
+          <a:p>
+            <a:pPr rtl="0"/>
+            <a:r>
+              <a:rPr lang="ru-RU" sz="1150" kern="0" dirty="0"/>
+              <a:t>(</a:t>
+            </a:r>
+            <a:r>
+              <a:rPr lang="en-US" sz="1150" kern="0" dirty="0"/>
+              <a:t>Data Scientist) (Python, </a:t>
+            </a:r>
+            <a:r>
+              <a:rPr lang="ru-RU" sz="1150" kern="0" dirty="0"/>
+              <a:t>С++) в НИИ ПАО Газпром</a:t>
+            </a:r>
+          </a:p>
+          <a:p>
+            <a:pPr rtl="0"/>
+            <a:endParaRPr lang="ru-RU" sz="1150" kern="0" dirty="0"/>
+          </a:p>
+          <a:p>
+            <a:pPr rtl="0"/>
+            <a:endParaRPr lang="ru-RU" sz="1150" b="1" kern="0" dirty="0"/>
+          </a:p>
+          <a:p>
+            <a:pPr rtl="0"/>
+            <a:r>
+              <a:rPr lang="ru-RU" sz="1150" b="1" kern="0" dirty="0"/>
+              <a:t>@</a:t>
+            </a:r>
+            <a:r>
+              <a:rPr lang="en-US" sz="1150" b="1" kern="0" dirty="0" err="1"/>
+              <a:t>stureiko</a:t>
+            </a:r>
+            <a:r>
+              <a:rPr lang="en-US" sz="1150" b="1" kern="0" dirty="0"/>
+              <a:t> (TG)</a:t>
+            </a:r>
+          </a:p>
+          <a:p>
+            <a:pPr rtl="0"/>
+            <a:endParaRPr lang="en-US" sz="1150" b="1" kern="0" dirty="0"/>
+          </a:p>
+          <a:p>
+            <a:pPr rtl="0"/>
+            <a:r>
+              <a:rPr lang="en-US" sz="1150" b="1" kern="0" dirty="0"/>
+              <a:t>LinkedIn: </a:t>
+            </a:r>
+            <a:r>
+              <a:rPr lang="en-US" sz="1150" kern="0" dirty="0">
+                <a:hlinkClick r:id="rId4"/>
+              </a:rPr>
+              <a:t>igor-stureiko</a:t>
+            </a:r>
+            <a:r>
+              <a:rPr lang="en-US" sz="1150" kern="0" dirty="0"/>
+              <a:t> </a:t>
+            </a:r>
+          </a:p>
+          <a:p>
+            <a:pPr rtl="0"/>
+            <a:endParaRPr lang="en-US" sz="1150" kern="0" dirty="0"/>
+          </a:p>
+          <a:p>
+            <a:pPr rtl="0"/>
+            <a:r>
+              <a:rPr lang="en-US" sz="1150" b="1" kern="0" dirty="0"/>
+              <a:t>@</a:t>
+            </a:r>
+            <a:r>
+              <a:rPr lang="en-US" sz="1150" b="1" kern="0" dirty="0" err="1"/>
+              <a:t>rl_fintech</a:t>
+            </a:r>
+            <a:r>
+              <a:rPr lang="en-US" sz="1150" b="1" kern="0" dirty="0"/>
+              <a:t> </a:t>
+            </a:r>
+            <a:r>
+              <a:rPr lang="en-US" sz="1150" kern="0" dirty="0"/>
+              <a:t>(</a:t>
+            </a:r>
+            <a:r>
+              <a:rPr lang="ru-RU" sz="1150" kern="0" dirty="0"/>
+              <a:t>Мой канал о моделях в бизнесе)</a:t>
+            </a:r>
+            <a:endParaRPr lang="ru-RU" sz="1400" kern="0" dirty="0"/>
+          </a:p>
+        </p:txBody>
+      </p:sp>
     </p:spTree>
   </p:cSld>
   <p:clrMapOvr>
@@ -12238,8 +12554,8 @@
         </p:nvSpPr>
         <p:spPr>
           <a:xfrm>
-            <a:off x="740239" y="1074905"/>
-            <a:ext cx="3556274" cy="376200"/>
+            <a:off x="740238" y="1074905"/>
+            <a:ext cx="4020611" cy="376200"/>
           </a:xfrm>
           <a:prstGeom prst="roundRect">
             <a:avLst>
@@ -12309,7 +12625,7 @@
         <p:spPr>
           <a:xfrm>
             <a:off x="740239" y="2219567"/>
-            <a:ext cx="3556275" cy="376200"/>
+            <a:ext cx="4020612" cy="376200"/>
           </a:xfrm>
           <a:prstGeom prst="roundRect">
             <a:avLst>
@@ -12378,8 +12694,8 @@
         </p:nvSpPr>
         <p:spPr>
           <a:xfrm>
-            <a:off x="740239" y="2791898"/>
-            <a:ext cx="3555066" cy="376200"/>
+            <a:off x="740238" y="2791898"/>
+            <a:ext cx="4019245" cy="376200"/>
           </a:xfrm>
           <a:prstGeom prst="roundRect">
             <a:avLst>
@@ -12452,7 +12768,7 @@
         </p:nvCxnSpPr>
         <p:spPr>
           <a:xfrm rot="10800000" flipV="1">
-            <a:off x="740239" y="1263004"/>
+            <a:off x="740238" y="1263004"/>
             <a:ext cx="12700" cy="572331"/>
           </a:xfrm>
           <a:prstGeom prst="curvedConnector3">
@@ -12485,11 +12801,11 @@
         <p:spPr>
           <a:xfrm rot="10800000" flipV="1">
             <a:off x="740239" y="2407666"/>
-            <a:ext cx="12700" cy="572331"/>
+            <a:ext cx="1" cy="572331"/>
           </a:xfrm>
           <a:prstGeom prst="curvedConnector3">
             <a:avLst>
-              <a:gd name="adj1" fmla="val 1800000"/>
+              <a:gd name="adj1" fmla="val 22860100000"/>
             </a:avLst>
           </a:prstGeom>
           <a:noFill/>
@@ -12518,8 +12834,8 @@
         </p:nvSpPr>
         <p:spPr>
           <a:xfrm>
-            <a:off x="740239" y="3364229"/>
-            <a:ext cx="3555066" cy="376200"/>
+            <a:off x="740238" y="3364229"/>
+            <a:ext cx="4019245" cy="376200"/>
           </a:xfrm>
           <a:prstGeom prst="roundRect">
             <a:avLst>
@@ -12598,7 +12914,7 @@
         </p:nvCxnSpPr>
         <p:spPr>
           <a:xfrm rot="10800000" flipV="1">
-            <a:off x="740239" y="2979997"/>
+            <a:off x="740238" y="2979997"/>
             <a:ext cx="12700" cy="572331"/>
           </a:xfrm>
           <a:prstGeom prst="curvedConnector3">
@@ -12632,8 +12948,8 @@
         </p:nvSpPr>
         <p:spPr>
           <a:xfrm>
-            <a:off x="740239" y="1647236"/>
-            <a:ext cx="3556274" cy="376200"/>
+            <a:off x="740238" y="1647236"/>
+            <a:ext cx="4020611" cy="376200"/>
           </a:xfrm>
           <a:prstGeom prst="roundRect">
             <a:avLst>
@@ -12702,13 +13018,13 @@
           <p:nvPr/>
         </p:nvCxnSpPr>
         <p:spPr>
-          <a:xfrm rot="10800000" flipV="1">
-            <a:off x="740239" y="1835335"/>
-            <a:ext cx="12700" cy="572331"/>
+          <a:xfrm rot="10800000" flipH="1" flipV="1">
+            <a:off x="740237" y="1835335"/>
+            <a:ext cx="1" cy="572331"/>
           </a:xfrm>
           <a:prstGeom prst="curvedConnector3">
             <a:avLst>
-              <a:gd name="adj1" fmla="val 1800000"/>
+              <a:gd name="adj1" fmla="val -22860000000"/>
             </a:avLst>
           </a:prstGeom>
           <a:noFill/>
@@ -12737,8 +13053,8 @@
         </p:nvSpPr>
         <p:spPr>
           <a:xfrm>
-            <a:off x="740239" y="3936560"/>
-            <a:ext cx="3555066" cy="376200"/>
+            <a:off x="740238" y="3936560"/>
+            <a:ext cx="4019245" cy="376200"/>
           </a:xfrm>
           <a:prstGeom prst="roundRect">
             <a:avLst>
@@ -12775,6 +13091,18 @@
               <a:buFont typeface="Arial"/>
               <a:buNone/>
             </a:pPr>
+            <a:r>
+              <a:rPr lang="ru-RU" sz="1600" b="0" i="0" u="none" strike="noStrike" cap="none" dirty="0">
+                <a:solidFill>
+                  <a:srgbClr val="000000"/>
+                </a:solidFill>
+                <a:latin typeface="Roboto"/>
+                <a:ea typeface="Roboto"/>
+                <a:cs typeface="Roboto"/>
+                <a:sym typeface="Roboto"/>
+              </a:rPr>
+              <a:t>Стационарный ряд</a:t>
+            </a:r>
             <a:endParaRPr sz="1600" b="0" i="0" u="none" strike="noStrike" cap="none" dirty="0">
               <a:solidFill>
                 <a:srgbClr val="000000"/>
@@ -12801,8 +13129,8 @@
         </p:nvSpPr>
         <p:spPr>
           <a:xfrm>
-            <a:off x="740239" y="4508891"/>
-            <a:ext cx="3555066" cy="376200"/>
+            <a:off x="740238" y="4508891"/>
+            <a:ext cx="4019245" cy="376200"/>
           </a:xfrm>
           <a:prstGeom prst="roundRect">
             <a:avLst>
@@ -12839,6 +13167,18 @@
               <a:buFont typeface="Arial"/>
               <a:buNone/>
             </a:pPr>
+            <a:r>
+              <a:rPr lang="ru-RU" sz="1600" b="0" i="0" u="none" strike="noStrike" cap="none" dirty="0">
+                <a:solidFill>
+                  <a:srgbClr val="000000"/>
+                </a:solidFill>
+                <a:latin typeface="Roboto"/>
+                <a:ea typeface="Roboto"/>
+                <a:cs typeface="Roboto"/>
+                <a:sym typeface="Roboto"/>
+              </a:rPr>
+              <a:t>Разложение ряда на компоненты</a:t>
+            </a:r>
             <a:endParaRPr sz="1600" b="0" i="0" u="none" strike="noStrike" cap="none" dirty="0">
               <a:solidFill>
                 <a:srgbClr val="000000"/>
@@ -12869,7 +13209,7 @@
         </p:nvCxnSpPr>
         <p:spPr>
           <a:xfrm rot="10800000" flipV="1">
-            <a:off x="740239" y="3552328"/>
+            <a:off x="740238" y="3552328"/>
             <a:ext cx="12700" cy="572331"/>
           </a:xfrm>
           <a:prstGeom prst="curvedConnector3">
@@ -12907,318 +13247,12 @@
         </p:nvCxnSpPr>
         <p:spPr>
           <a:xfrm rot="10800000" flipV="1">
-            <a:off x="740239" y="4124659"/>
+            <a:off x="740238" y="4124659"/>
             <a:ext cx="12700" cy="572331"/>
           </a:xfrm>
           <a:prstGeom prst="curvedConnector3">
             <a:avLst>
               <a:gd name="adj1" fmla="val 1800000"/>
-            </a:avLst>
-          </a:prstGeom>
-          <a:noFill/>
-          <a:ln w="9525" cap="flat" cmpd="sng">
-            <a:solidFill>
-              <a:schemeClr val="dk1"/>
-            </a:solidFill>
-            <a:prstDash val="dash"/>
-            <a:round/>
-            <a:headEnd type="none" w="sm" len="sm"/>
-            <a:tailEnd type="none" w="sm" len="sm"/>
-          </a:ln>
-        </p:spPr>
-      </p:cxnSp>
-      <p:sp>
-        <p:nvSpPr>
-          <p:cNvPr id="19" name="Google Shape;238;p37">
-            <a:extLst>
-              <a:ext uri="{FF2B5EF4-FFF2-40B4-BE49-F238E27FC236}">
-                <a16:creationId xmlns:a16="http://schemas.microsoft.com/office/drawing/2014/main" id="{A172070A-2138-6C49-9D34-F783A5DF1F56}"/>
-              </a:ext>
-            </a:extLst>
-          </p:cNvPr>
-          <p:cNvSpPr/>
-          <p:nvPr/>
-        </p:nvSpPr>
-        <p:spPr>
-          <a:xfrm>
-            <a:off x="4933545" y="3368775"/>
-            <a:ext cx="3835392" cy="376200"/>
-          </a:xfrm>
-          <a:prstGeom prst="roundRect">
-            <a:avLst>
-              <a:gd name="adj" fmla="val 16667"/>
-            </a:avLst>
-          </a:prstGeom>
-          <a:solidFill>
-            <a:srgbClr val="FFD966"/>
-          </a:solidFill>
-          <a:ln>
-            <a:noFill/>
-          </a:ln>
-        </p:spPr>
-        <p:txBody>
-          <a:bodyPr spcFirstLastPara="1" wrap="square" lIns="162000" tIns="91425" rIns="162000" bIns="91425" anchor="ctr" anchorCtr="0">
-            <a:noAutofit/>
-          </a:bodyPr>
-          <a:lstStyle/>
-          <a:p>
-            <a:pPr marL="0" marR="0" lvl="0" indent="0" algn="l" rtl="0">
-              <a:lnSpc>
-                <a:spcPct val="100000"/>
-              </a:lnSpc>
-              <a:spcBef>
-                <a:spcPts val="0"/>
-              </a:spcBef>
-              <a:spcAft>
-                <a:spcPts val="0"/>
-              </a:spcAft>
-              <a:buClr>
-                <a:srgbClr val="000000"/>
-              </a:buClr>
-              <a:buSzPts val="1600"/>
-              <a:buFont typeface="Arial"/>
-              <a:buNone/>
-            </a:pPr>
-            <a:endParaRPr sz="1600" b="0" i="0" u="none" strike="noStrike" cap="none" dirty="0">
-              <a:solidFill>
-                <a:srgbClr val="000000"/>
-              </a:solidFill>
-              <a:latin typeface="Roboto"/>
-              <a:ea typeface="Roboto"/>
-              <a:cs typeface="Roboto"/>
-              <a:sym typeface="Roboto"/>
-            </a:endParaRPr>
-          </a:p>
-        </p:txBody>
-      </p:sp>
-      <p:sp>
-        <p:nvSpPr>
-          <p:cNvPr id="20" name="Google Shape;238;p37">
-            <a:extLst>
-              <a:ext uri="{FF2B5EF4-FFF2-40B4-BE49-F238E27FC236}">
-                <a16:creationId xmlns:a16="http://schemas.microsoft.com/office/drawing/2014/main" id="{98A647DE-FE87-0645-950D-B25BED3B6CCB}"/>
-              </a:ext>
-            </a:extLst>
-          </p:cNvPr>
-          <p:cNvSpPr/>
-          <p:nvPr/>
-        </p:nvSpPr>
-        <p:spPr>
-          <a:xfrm>
-            <a:off x="4933545" y="3934744"/>
-            <a:ext cx="3835392" cy="376200"/>
-          </a:xfrm>
-          <a:prstGeom prst="roundRect">
-            <a:avLst>
-              <a:gd name="adj" fmla="val 16667"/>
-            </a:avLst>
-          </a:prstGeom>
-          <a:solidFill>
-            <a:srgbClr val="FFD966"/>
-          </a:solidFill>
-          <a:ln>
-            <a:noFill/>
-          </a:ln>
-        </p:spPr>
-        <p:txBody>
-          <a:bodyPr spcFirstLastPara="1" wrap="square" lIns="162000" tIns="91425" rIns="162000" bIns="91425" anchor="ctr" anchorCtr="0">
-            <a:noAutofit/>
-          </a:bodyPr>
-          <a:lstStyle/>
-          <a:p>
-            <a:pPr marL="0" marR="0" lvl="0" indent="0" algn="l" rtl="0">
-              <a:lnSpc>
-                <a:spcPct val="100000"/>
-              </a:lnSpc>
-              <a:spcBef>
-                <a:spcPts val="0"/>
-              </a:spcBef>
-              <a:spcAft>
-                <a:spcPts val="0"/>
-              </a:spcAft>
-              <a:buClr>
-                <a:srgbClr val="000000"/>
-              </a:buClr>
-              <a:buSzPts val="1600"/>
-              <a:buFont typeface="Arial"/>
-              <a:buNone/>
-            </a:pPr>
-            <a:endParaRPr sz="1600" b="0" i="0" u="none" strike="noStrike" cap="none" dirty="0">
-              <a:solidFill>
-                <a:srgbClr val="000000"/>
-              </a:solidFill>
-              <a:latin typeface="Roboto"/>
-              <a:ea typeface="Roboto"/>
-              <a:cs typeface="Roboto"/>
-              <a:sym typeface="Roboto"/>
-            </a:endParaRPr>
-          </a:p>
-        </p:txBody>
-      </p:sp>
-      <p:sp>
-        <p:nvSpPr>
-          <p:cNvPr id="22" name="Google Shape;238;p37">
-            <a:extLst>
-              <a:ext uri="{FF2B5EF4-FFF2-40B4-BE49-F238E27FC236}">
-                <a16:creationId xmlns:a16="http://schemas.microsoft.com/office/drawing/2014/main" id="{C5983852-647D-B64D-8505-C5AC5056B8A5}"/>
-              </a:ext>
-            </a:extLst>
-          </p:cNvPr>
-          <p:cNvSpPr/>
-          <p:nvPr/>
-        </p:nvSpPr>
-        <p:spPr>
-          <a:xfrm>
-            <a:off x="4953000" y="4508890"/>
-            <a:ext cx="3835392" cy="376200"/>
-          </a:xfrm>
-          <a:prstGeom prst="roundRect">
-            <a:avLst>
-              <a:gd name="adj" fmla="val 16667"/>
-            </a:avLst>
-          </a:prstGeom>
-          <a:solidFill>
-            <a:srgbClr val="FFD966"/>
-          </a:solidFill>
-          <a:ln>
-            <a:noFill/>
-          </a:ln>
-        </p:spPr>
-        <p:txBody>
-          <a:bodyPr spcFirstLastPara="1" wrap="square" lIns="162000" tIns="91425" rIns="162000" bIns="91425" anchor="ctr" anchorCtr="0">
-            <a:noAutofit/>
-          </a:bodyPr>
-          <a:lstStyle/>
-          <a:p>
-            <a:pPr marL="0" marR="0" lvl="0" indent="0" algn="l" rtl="0">
-              <a:lnSpc>
-                <a:spcPct val="100000"/>
-              </a:lnSpc>
-              <a:spcBef>
-                <a:spcPts val="0"/>
-              </a:spcBef>
-              <a:spcAft>
-                <a:spcPts val="0"/>
-              </a:spcAft>
-              <a:buClr>
-                <a:srgbClr val="000000"/>
-              </a:buClr>
-              <a:buSzPts val="1600"/>
-              <a:buFont typeface="Arial"/>
-              <a:buNone/>
-            </a:pPr>
-            <a:endParaRPr sz="1600" b="0" i="0" u="none" strike="noStrike" cap="none" dirty="0">
-              <a:solidFill>
-                <a:srgbClr val="000000"/>
-              </a:solidFill>
-              <a:latin typeface="Roboto"/>
-              <a:ea typeface="Roboto"/>
-              <a:cs typeface="Roboto"/>
-              <a:sym typeface="Roboto"/>
-            </a:endParaRPr>
-          </a:p>
-        </p:txBody>
-      </p:sp>
-      <p:cxnSp>
-        <p:nvCxnSpPr>
-          <p:cNvPr id="23" name="Google Shape;242;p37">
-            <a:extLst>
-              <a:ext uri="{FF2B5EF4-FFF2-40B4-BE49-F238E27FC236}">
-                <a16:creationId xmlns:a16="http://schemas.microsoft.com/office/drawing/2014/main" id="{A4EA118F-BD30-6D43-ADC8-AF6ACCDE8AAE}"/>
-              </a:ext>
-            </a:extLst>
-          </p:cNvPr>
-          <p:cNvCxnSpPr>
-            <a:cxnSpLocks/>
-            <a:stCxn id="19" idx="1"/>
-            <a:endCxn id="17" idx="3"/>
-          </p:cNvCxnSpPr>
-          <p:nvPr/>
-        </p:nvCxnSpPr>
-        <p:spPr>
-          <a:xfrm rot="10800000" flipV="1">
-            <a:off x="4295305" y="3556875"/>
-            <a:ext cx="638240" cy="1140116"/>
-          </a:xfrm>
-          <a:prstGeom prst="curvedConnector3">
-            <a:avLst>
-              <a:gd name="adj1" fmla="val 50000"/>
-            </a:avLst>
-          </a:prstGeom>
-          <a:noFill/>
-          <a:ln w="9525" cap="flat" cmpd="sng">
-            <a:solidFill>
-              <a:schemeClr val="dk1"/>
-            </a:solidFill>
-            <a:prstDash val="dash"/>
-            <a:round/>
-            <a:headEnd type="none" w="sm" len="sm"/>
-            <a:tailEnd type="none" w="sm" len="sm"/>
-          </a:ln>
-        </p:spPr>
-      </p:cxnSp>
-      <p:cxnSp>
-        <p:nvCxnSpPr>
-          <p:cNvPr id="25" name="Google Shape;242;p37">
-            <a:extLst>
-              <a:ext uri="{FF2B5EF4-FFF2-40B4-BE49-F238E27FC236}">
-                <a16:creationId xmlns:a16="http://schemas.microsoft.com/office/drawing/2014/main" id="{32C3D994-1467-F841-A5CB-BCCCE34A5946}"/>
-              </a:ext>
-            </a:extLst>
-          </p:cNvPr>
-          <p:cNvCxnSpPr>
-            <a:cxnSpLocks/>
-            <a:stCxn id="19" idx="1"/>
-            <a:endCxn id="20" idx="1"/>
-          </p:cNvCxnSpPr>
-          <p:nvPr/>
-        </p:nvCxnSpPr>
-        <p:spPr>
-          <a:xfrm rot="10800000" flipV="1">
-            <a:off x="4933545" y="3556874"/>
-            <a:ext cx="12700" cy="565969"/>
-          </a:xfrm>
-          <a:prstGeom prst="curvedConnector3">
-            <a:avLst>
-              <a:gd name="adj1" fmla="val 1800000"/>
-            </a:avLst>
-          </a:prstGeom>
-          <a:noFill/>
-          <a:ln w="9525" cap="flat" cmpd="sng">
-            <a:solidFill>
-              <a:schemeClr val="dk1"/>
-            </a:solidFill>
-            <a:prstDash val="dash"/>
-            <a:round/>
-            <a:headEnd type="none" w="sm" len="sm"/>
-            <a:tailEnd type="none" w="sm" len="sm"/>
-          </a:ln>
-        </p:spPr>
-      </p:cxnSp>
-      <p:cxnSp>
-        <p:nvCxnSpPr>
-          <p:cNvPr id="28" name="Google Shape;242;p37">
-            <a:extLst>
-              <a:ext uri="{FF2B5EF4-FFF2-40B4-BE49-F238E27FC236}">
-                <a16:creationId xmlns:a16="http://schemas.microsoft.com/office/drawing/2014/main" id="{76CD26E3-5D02-724A-9FEB-6E20D6BA6263}"/>
-              </a:ext>
-            </a:extLst>
-          </p:cNvPr>
-          <p:cNvCxnSpPr>
-            <a:cxnSpLocks/>
-            <a:stCxn id="20" idx="1"/>
-            <a:endCxn id="22" idx="1"/>
-          </p:cNvCxnSpPr>
-          <p:nvPr/>
-        </p:nvCxnSpPr>
-        <p:spPr>
-          <a:xfrm rot="10800000" flipH="1" flipV="1">
-            <a:off x="4933544" y="4122844"/>
-            <a:ext cx="19455" cy="574146"/>
-          </a:xfrm>
-          <a:prstGeom prst="curvedConnector3">
-            <a:avLst>
-              <a:gd name="adj1" fmla="val -1175019"/>
             </a:avLst>
           </a:prstGeom>
           <a:noFill/>

</xml_diff>